<commit_message>
add exam for decision algorithm
</commit_message>
<xml_diff>
--- a/PPT/人工智能导论：第四章 统计机器学习.pptx
+++ b/PPT/人工智能导论：第四章 统计机器学习.pptx
@@ -322,7 +322,7 @@
             <a:fld id="{005A66E1-596A-496E-B96E-FE454130F19C}" type="datetimeFigureOut">
               <a:rPr lang="zh-CN" altLang="en-US" smtClean="0"/>
               <a:pPr/>
-              <a:t>2022/6/12</a:t>
+              <a:t>2022/6/14</a:t>
             </a:fld>
             <a:endParaRPr lang="zh-CN" altLang="en-US"/>
           </a:p>
@@ -489,7 +489,7 @@
             <a:fld id="{0102705F-8347-41A8-82E6-B2920132BF3D}" type="datetimeFigureOut">
               <a:rPr lang="en-US" smtClean="0"/>
               <a:pPr/>
-              <a:t>6/12/22</a:t>
+              <a:t>6/14/22</a:t>
             </a:fld>
             <a:endParaRPr lang="en-US"/>
           </a:p>
@@ -2641,21 +2641,19 @@
       </p:grpSpPr>
       <p:sp>
         <p:nvSpPr>
-          <p:cNvPr id="157698" name="幻灯片图像占位符 1"/>
-          <p:cNvSpPr>
-            <a:spLocks noGrp="1" noRot="1" noChangeAspect="1" noTextEdit="1"/>
+          <p:cNvPr id="2" name="Slide Image Placeholder 1"/>
+          <p:cNvSpPr>
+            <a:spLocks noGrp="1" noRot="1" noChangeAspect="1"/>
           </p:cNvSpPr>
           <p:nvPr>
             <p:ph type="sldImg"/>
           </p:nvPr>
         </p:nvSpPr>
-        <p:spPr>
-          <a:ln/>
-        </p:spPr>
-      </p:sp>
-      <p:sp>
-        <p:nvSpPr>
-          <p:cNvPr id="157699" name="备注占位符 2"/>
+        <p:spPr/>
+      </p:sp>
+      <p:sp>
+        <p:nvSpPr>
+          <p:cNvPr id="3" name="Notes Placeholder 2"/>
           <p:cNvSpPr>
             <a:spLocks noGrp="1"/>
           </p:cNvSpPr>
@@ -2663,23 +2661,18 @@
             <p:ph type="body" idx="1"/>
           </p:nvPr>
         </p:nvSpPr>
-        <p:spPr>
-          <a:noFill/>
-          <a:ln/>
-        </p:spPr>
+        <p:spPr/>
         <p:txBody>
           <a:bodyPr/>
           <a:lstStyle/>
           <a:p>
-            <a:endParaRPr lang="zh-CN" altLang="en-US">
-              <a:ea typeface="黑体" pitchFamily="49" charset="-122"/>
-            </a:endParaRPr>
-          </a:p>
-        </p:txBody>
-      </p:sp>
-      <p:sp>
-        <p:nvSpPr>
-          <p:cNvPr id="157700" name="灯片编号占位符 3"/>
+            <a:endParaRPr lang="en-US" dirty="0"/>
+          </a:p>
+        </p:txBody>
+      </p:sp>
+      <p:sp>
+        <p:nvSpPr>
+          <p:cNvPr id="4" name="Slide Number Placeholder 3"/>
           <p:cNvSpPr>
             <a:spLocks noGrp="1"/>
           </p:cNvSpPr>
@@ -2687,30 +2680,24 @@
             <p:ph type="sldNum" sz="quarter" idx="5"/>
           </p:nvPr>
         </p:nvSpPr>
-        <p:spPr>
-          <a:noFill/>
-        </p:spPr>
+        <p:spPr/>
         <p:txBody>
           <a:bodyPr/>
           <a:lstStyle/>
           <a:p>
-            <a:fld id="{020A8296-C142-422E-B29E-D1BC0446F021}" type="slidenum">
-              <a:rPr lang="en-US" altLang="zh-CN" smtClean="0">
-                <a:ea typeface="黑体" pitchFamily="49" charset="-122"/>
-              </a:rPr>
+            <a:fld id="{D50AF6DD-051E-413B-8808-23D5AB3BD9E4}" type="slidenum">
+              <a:rPr lang="en-US" smtClean="0"/>
               <a:pPr/>
-              <a:t>72</a:t>
+              <a:t>70</a:t>
             </a:fld>
-            <a:endParaRPr lang="en-US" altLang="zh-CN">
-              <a:ea typeface="黑体" pitchFamily="49" charset="-122"/>
-            </a:endParaRPr>
+            <a:endParaRPr lang="en-US"/>
           </a:p>
         </p:txBody>
       </p:sp>
     </p:spTree>
     <p:extLst>
       <p:ext uri="{BB962C8B-B14F-4D97-AF65-F5344CB8AC3E}">
-        <p14:creationId xmlns:p14="http://schemas.microsoft.com/office/powerpoint/2010/main" val="2292267342"/>
+        <p14:creationId xmlns:p14="http://schemas.microsoft.com/office/powerpoint/2010/main" val="3917440462"/>
       </p:ext>
     </p:extLst>
   </p:cSld>
@@ -2739,7 +2726,7 @@
       </p:grpSpPr>
       <p:sp>
         <p:nvSpPr>
-          <p:cNvPr id="158722" name="幻灯片图像占位符 1"/>
+          <p:cNvPr id="157698" name="幻灯片图像占位符 1"/>
           <p:cNvSpPr>
             <a:spLocks noGrp="1" noRot="1" noChangeAspect="1" noTextEdit="1"/>
           </p:cNvSpPr>
@@ -2753,7 +2740,7 @@
       </p:sp>
       <p:sp>
         <p:nvSpPr>
-          <p:cNvPr id="158723" name="备注占位符 2"/>
+          <p:cNvPr id="157699" name="备注占位符 2"/>
           <p:cNvSpPr>
             <a:spLocks noGrp="1"/>
           </p:cNvSpPr>
@@ -2777,7 +2764,7 @@
       </p:sp>
       <p:sp>
         <p:nvSpPr>
-          <p:cNvPr id="158724" name="灯片编号占位符 3"/>
+          <p:cNvPr id="157700" name="灯片编号占位符 3"/>
           <p:cNvSpPr>
             <a:spLocks noGrp="1"/>
           </p:cNvSpPr>
@@ -2792,12 +2779,12 @@
           <a:bodyPr/>
           <a:lstStyle/>
           <a:p>
-            <a:fld id="{E2C58FBF-F393-47C8-9376-7570EF7E418B}" type="slidenum">
+            <a:fld id="{020A8296-C142-422E-B29E-D1BC0446F021}" type="slidenum">
               <a:rPr lang="en-US" altLang="zh-CN" smtClean="0">
                 <a:ea typeface="黑体" pitchFamily="49" charset="-122"/>
               </a:rPr>
               <a:pPr/>
-              <a:t>75</a:t>
+              <a:t>72</a:t>
             </a:fld>
             <a:endParaRPr lang="en-US" altLang="zh-CN">
               <a:ea typeface="黑体" pitchFamily="49" charset="-122"/>
@@ -2808,7 +2795,7 @@
     </p:spTree>
     <p:extLst>
       <p:ext uri="{BB962C8B-B14F-4D97-AF65-F5344CB8AC3E}">
-        <p14:creationId xmlns:p14="http://schemas.microsoft.com/office/powerpoint/2010/main" val="2287826408"/>
+        <p14:creationId xmlns:p14="http://schemas.microsoft.com/office/powerpoint/2010/main" val="2292267342"/>
       </p:ext>
     </p:extLst>
   </p:cSld>
@@ -2837,19 +2824,21 @@
       </p:grpSpPr>
       <p:sp>
         <p:nvSpPr>
-          <p:cNvPr id="2" name="Slide Image Placeholder 1"/>
-          <p:cNvSpPr>
-            <a:spLocks noGrp="1" noRot="1" noChangeAspect="1"/>
+          <p:cNvPr id="158722" name="幻灯片图像占位符 1"/>
+          <p:cNvSpPr>
+            <a:spLocks noGrp="1" noRot="1" noChangeAspect="1" noTextEdit="1"/>
           </p:cNvSpPr>
           <p:nvPr>
             <p:ph type="sldImg"/>
           </p:nvPr>
         </p:nvSpPr>
-        <p:spPr/>
-      </p:sp>
-      <p:sp>
-        <p:nvSpPr>
-          <p:cNvPr id="3" name="Notes Placeholder 2"/>
+        <p:spPr>
+          <a:ln/>
+        </p:spPr>
+      </p:sp>
+      <p:sp>
+        <p:nvSpPr>
+          <p:cNvPr id="158723" name="备注占位符 2"/>
           <p:cNvSpPr>
             <a:spLocks noGrp="1"/>
           </p:cNvSpPr>
@@ -2857,18 +2846,23 @@
             <p:ph type="body" idx="1"/>
           </p:nvPr>
         </p:nvSpPr>
-        <p:spPr/>
+        <p:spPr>
+          <a:noFill/>
+          <a:ln/>
+        </p:spPr>
         <p:txBody>
           <a:bodyPr/>
           <a:lstStyle/>
           <a:p>
-            <a:endParaRPr lang="en-US" dirty="0"/>
-          </a:p>
-        </p:txBody>
-      </p:sp>
-      <p:sp>
-        <p:nvSpPr>
-          <p:cNvPr id="4" name="Slide Number Placeholder 3"/>
+            <a:endParaRPr lang="zh-CN" altLang="en-US">
+              <a:ea typeface="黑体" pitchFamily="49" charset="-122"/>
+            </a:endParaRPr>
+          </a:p>
+        </p:txBody>
+      </p:sp>
+      <p:sp>
+        <p:nvSpPr>
+          <p:cNvPr id="158724" name="灯片编号占位符 3"/>
           <p:cNvSpPr>
             <a:spLocks noGrp="1"/>
           </p:cNvSpPr>
@@ -2876,24 +2870,30 @@
             <p:ph type="sldNum" sz="quarter" idx="5"/>
           </p:nvPr>
         </p:nvSpPr>
-        <p:spPr/>
+        <p:spPr>
+          <a:noFill/>
+        </p:spPr>
         <p:txBody>
           <a:bodyPr/>
           <a:lstStyle/>
           <a:p>
-            <a:fld id="{D50AF6DD-051E-413B-8808-23D5AB3BD9E4}" type="slidenum">
-              <a:rPr lang="en-US" smtClean="0"/>
+            <a:fld id="{E2C58FBF-F393-47C8-9376-7570EF7E418B}" type="slidenum">
+              <a:rPr lang="en-US" altLang="zh-CN" smtClean="0">
+                <a:ea typeface="黑体" pitchFamily="49" charset="-122"/>
+              </a:rPr>
               <a:pPr/>
-              <a:t>76</a:t>
+              <a:t>75</a:t>
             </a:fld>
-            <a:endParaRPr lang="en-US"/>
+            <a:endParaRPr lang="en-US" altLang="zh-CN">
+              <a:ea typeface="黑体" pitchFamily="49" charset="-122"/>
+            </a:endParaRPr>
           </a:p>
         </p:txBody>
       </p:sp>
     </p:spTree>
     <p:extLst>
       <p:ext uri="{BB962C8B-B14F-4D97-AF65-F5344CB8AC3E}">
-        <p14:creationId xmlns:p14="http://schemas.microsoft.com/office/powerpoint/2010/main" val="1984502093"/>
+        <p14:creationId xmlns:p14="http://schemas.microsoft.com/office/powerpoint/2010/main" val="2287826408"/>
       </p:ext>
     </p:extLst>
   </p:cSld>
@@ -2922,7 +2922,7 @@
       </p:grpSpPr>
       <p:sp>
         <p:nvSpPr>
-          <p:cNvPr id="2" name="幻灯片图像占位符 1"/>
+          <p:cNvPr id="2" name="Slide Image Placeholder 1"/>
           <p:cNvSpPr>
             <a:spLocks noGrp="1" noRot="1" noChangeAspect="1"/>
           </p:cNvSpPr>
@@ -2934,7 +2934,7 @@
       </p:sp>
       <p:sp>
         <p:nvSpPr>
-          <p:cNvPr id="3" name="备注占位符 2"/>
+          <p:cNvPr id="3" name="Notes Placeholder 2"/>
           <p:cNvSpPr>
             <a:spLocks noGrp="1"/>
           </p:cNvSpPr>
@@ -2944,23 +2944,21 @@
         </p:nvSpPr>
         <p:spPr/>
         <p:txBody>
-          <a:bodyPr>
-            <a:normAutofit/>
-          </a:bodyPr>
-          <a:lstStyle/>
-          <a:p>
-            <a:endParaRPr lang="zh-CN" altLang="en-US" dirty="0"/>
-          </a:p>
-        </p:txBody>
-      </p:sp>
-      <p:sp>
-        <p:nvSpPr>
-          <p:cNvPr id="4" name="灯片编号占位符 3"/>
+          <a:bodyPr/>
+          <a:lstStyle/>
+          <a:p>
+            <a:endParaRPr lang="en-US" dirty="0"/>
+          </a:p>
+        </p:txBody>
+      </p:sp>
+      <p:sp>
+        <p:nvSpPr>
+          <p:cNvPr id="4" name="Slide Number Placeholder 3"/>
           <p:cNvSpPr>
             <a:spLocks noGrp="1"/>
           </p:cNvSpPr>
           <p:nvPr>
-            <p:ph type="sldNum" sz="quarter" idx="10"/>
+            <p:ph type="sldNum" sz="quarter" idx="5"/>
           </p:nvPr>
         </p:nvSpPr>
         <p:spPr/>
@@ -2971,7 +2969,7 @@
             <a:fld id="{D50AF6DD-051E-413B-8808-23D5AB3BD9E4}" type="slidenum">
               <a:rPr lang="en-US" smtClean="0"/>
               <a:pPr/>
-              <a:t>79</a:t>
+              <a:t>76</a:t>
             </a:fld>
             <a:endParaRPr lang="en-US"/>
           </a:p>
@@ -2980,7 +2978,7 @@
     </p:spTree>
     <p:extLst>
       <p:ext uri="{BB962C8B-B14F-4D97-AF65-F5344CB8AC3E}">
-        <p14:creationId xmlns:p14="http://schemas.microsoft.com/office/powerpoint/2010/main" val="3936358210"/>
+        <p14:creationId xmlns:p14="http://schemas.microsoft.com/office/powerpoint/2010/main" val="1984502093"/>
       </p:ext>
     </p:extLst>
   </p:cSld>
@@ -3009,21 +3007,19 @@
       </p:grpSpPr>
       <p:sp>
         <p:nvSpPr>
-          <p:cNvPr id="159746" name="幻灯片图像占位符 1"/>
-          <p:cNvSpPr>
-            <a:spLocks noGrp="1" noRot="1" noChangeAspect="1" noTextEdit="1"/>
+          <p:cNvPr id="2" name="幻灯片图像占位符 1"/>
+          <p:cNvSpPr>
+            <a:spLocks noGrp="1" noRot="1" noChangeAspect="1"/>
           </p:cNvSpPr>
           <p:nvPr>
             <p:ph type="sldImg"/>
           </p:nvPr>
         </p:nvSpPr>
-        <p:spPr>
-          <a:ln/>
-        </p:spPr>
-      </p:sp>
-      <p:sp>
-        <p:nvSpPr>
-          <p:cNvPr id="159747" name="备注占位符 2"/>
+        <p:spPr/>
+      </p:sp>
+      <p:sp>
+        <p:nvSpPr>
+          <p:cNvPr id="3" name="备注占位符 2"/>
           <p:cNvSpPr>
             <a:spLocks noGrp="1"/>
           </p:cNvSpPr>
@@ -3031,69 +3027,45 @@
             <p:ph type="body" idx="1"/>
           </p:nvPr>
         </p:nvSpPr>
-        <p:spPr>
-          <a:noFill/>
-          <a:ln/>
-        </p:spPr>
+        <p:spPr/>
+        <p:txBody>
+          <a:bodyPr>
+            <a:normAutofit/>
+          </a:bodyPr>
+          <a:lstStyle/>
+          <a:p>
+            <a:endParaRPr lang="zh-CN" altLang="en-US" dirty="0"/>
+          </a:p>
+        </p:txBody>
+      </p:sp>
+      <p:sp>
+        <p:nvSpPr>
+          <p:cNvPr id="4" name="灯片编号占位符 3"/>
+          <p:cNvSpPr>
+            <a:spLocks noGrp="1"/>
+          </p:cNvSpPr>
+          <p:nvPr>
+            <p:ph type="sldNum" sz="quarter" idx="10"/>
+          </p:nvPr>
+        </p:nvSpPr>
+        <p:spPr/>
         <p:txBody>
           <a:bodyPr/>
           <a:lstStyle/>
           <a:p>
-            <a:r>
-              <a:rPr lang="zh-CN" altLang="en-US">
-                <a:ea typeface="黑体" pitchFamily="49" charset="-122"/>
-              </a:rPr>
-              <a:t>一个属性有很多取值，划分成很多不同的子集，就说明该属性的熵大。除以</a:t>
-            </a:r>
-            <a:r>
-              <a:rPr lang="en-US" altLang="zh-CN">
-                <a:ea typeface="黑体" pitchFamily="49" charset="-122"/>
-              </a:rPr>
-              <a:t>HA(D)</a:t>
-            </a:r>
-            <a:r>
-              <a:rPr lang="zh-CN" altLang="en-US">
-                <a:ea typeface="黑体" pitchFamily="49" charset="-122"/>
-              </a:rPr>
-              <a:t>以避免划分太细的特征。</a:t>
-            </a:r>
-          </a:p>
-        </p:txBody>
-      </p:sp>
-      <p:sp>
-        <p:nvSpPr>
-          <p:cNvPr id="159748" name="灯片编号占位符 3"/>
-          <p:cNvSpPr>
-            <a:spLocks noGrp="1"/>
-          </p:cNvSpPr>
-          <p:nvPr>
-            <p:ph type="sldNum" sz="quarter" idx="5"/>
-          </p:nvPr>
-        </p:nvSpPr>
-        <p:spPr>
-          <a:noFill/>
-        </p:spPr>
-        <p:txBody>
-          <a:bodyPr/>
-          <a:lstStyle/>
-          <a:p>
-            <a:fld id="{2953F01C-8DE6-4205-9166-4DFB58485CAE}" type="slidenum">
-              <a:rPr lang="en-US" altLang="zh-CN" smtClean="0">
-                <a:ea typeface="黑体" pitchFamily="49" charset="-122"/>
-              </a:rPr>
+            <a:fld id="{D50AF6DD-051E-413B-8808-23D5AB3BD9E4}" type="slidenum">
+              <a:rPr lang="en-US" smtClean="0"/>
               <a:pPr/>
-              <a:t>81</a:t>
+              <a:t>79</a:t>
             </a:fld>
-            <a:endParaRPr lang="en-US" altLang="zh-CN">
-              <a:ea typeface="黑体" pitchFamily="49" charset="-122"/>
-            </a:endParaRPr>
+            <a:endParaRPr lang="en-US"/>
           </a:p>
         </p:txBody>
       </p:sp>
     </p:spTree>
     <p:extLst>
       <p:ext uri="{BB962C8B-B14F-4D97-AF65-F5344CB8AC3E}">
-        <p14:creationId xmlns:p14="http://schemas.microsoft.com/office/powerpoint/2010/main" val="903667938"/>
+        <p14:creationId xmlns:p14="http://schemas.microsoft.com/office/powerpoint/2010/main" val="3936358210"/>
       </p:ext>
     </p:extLst>
   </p:cSld>
@@ -3223,19 +3195,21 @@
       </p:grpSpPr>
       <p:sp>
         <p:nvSpPr>
-          <p:cNvPr id="2" name="幻灯片图像占位符 1"/>
-          <p:cNvSpPr>
-            <a:spLocks noGrp="1" noRot="1" noChangeAspect="1"/>
+          <p:cNvPr id="159746" name="幻灯片图像占位符 1"/>
+          <p:cNvSpPr>
+            <a:spLocks noGrp="1" noRot="1" noChangeAspect="1" noTextEdit="1"/>
           </p:cNvSpPr>
           <p:nvPr>
             <p:ph type="sldImg"/>
           </p:nvPr>
         </p:nvSpPr>
-        <p:spPr/>
-      </p:sp>
-      <p:sp>
-        <p:nvSpPr>
-          <p:cNvPr id="3" name="备注占位符 2"/>
+        <p:spPr>
+          <a:ln/>
+        </p:spPr>
+      </p:sp>
+      <p:sp>
+        <p:nvSpPr>
+          <p:cNvPr id="159747" name="备注占位符 2"/>
           <p:cNvSpPr>
             <a:spLocks noGrp="1"/>
           </p:cNvSpPr>
@@ -3243,47 +3217,69 @@
             <p:ph type="body" idx="1"/>
           </p:nvPr>
         </p:nvSpPr>
-        <p:spPr/>
+        <p:spPr>
+          <a:noFill/>
+          <a:ln/>
+        </p:spPr>
         <p:txBody>
           <a:bodyPr/>
           <a:lstStyle/>
           <a:p>
             <a:r>
-              <a:rPr lang="en-US" altLang="zh-CN"/>
-              <a:t>2021.0531</a:t>
-            </a:r>
-            <a:endParaRPr lang="zh-CN" altLang="en-US" dirty="0"/>
-          </a:p>
-        </p:txBody>
-      </p:sp>
-      <p:sp>
-        <p:nvSpPr>
-          <p:cNvPr id="4" name="灯片编号占位符 3"/>
+              <a:rPr lang="zh-CN" altLang="en-US">
+                <a:ea typeface="黑体" pitchFamily="49" charset="-122"/>
+              </a:rPr>
+              <a:t>一个属性有很多取值，划分成很多不同的子集，就说明该属性的熵大。除以</a:t>
+            </a:r>
+            <a:r>
+              <a:rPr lang="en-US" altLang="zh-CN">
+                <a:ea typeface="黑体" pitchFamily="49" charset="-122"/>
+              </a:rPr>
+              <a:t>HA(D)</a:t>
+            </a:r>
+            <a:r>
+              <a:rPr lang="zh-CN" altLang="en-US">
+                <a:ea typeface="黑体" pitchFamily="49" charset="-122"/>
+              </a:rPr>
+              <a:t>以避免划分太细的特征。</a:t>
+            </a:r>
+          </a:p>
+        </p:txBody>
+      </p:sp>
+      <p:sp>
+        <p:nvSpPr>
+          <p:cNvPr id="159748" name="灯片编号占位符 3"/>
           <p:cNvSpPr>
             <a:spLocks noGrp="1"/>
           </p:cNvSpPr>
           <p:nvPr>
-            <p:ph type="sldNum" sz="quarter" idx="10"/>
+            <p:ph type="sldNum" sz="quarter" idx="5"/>
           </p:nvPr>
         </p:nvSpPr>
-        <p:spPr/>
+        <p:spPr>
+          <a:noFill/>
+        </p:spPr>
         <p:txBody>
           <a:bodyPr/>
           <a:lstStyle/>
           <a:p>
-            <a:fld id="{D50AF6DD-051E-413B-8808-23D5AB3BD9E4}" type="slidenum">
-              <a:rPr lang="en-US" smtClean="0"/>
+            <a:fld id="{2953F01C-8DE6-4205-9166-4DFB58485CAE}" type="slidenum">
+              <a:rPr lang="en-US" altLang="zh-CN" smtClean="0">
+                <a:ea typeface="黑体" pitchFamily="49" charset="-122"/>
+              </a:rPr>
               <a:pPr/>
-              <a:t>84</a:t>
+              <a:t>81</a:t>
             </a:fld>
-            <a:endParaRPr lang="en-US"/>
+            <a:endParaRPr lang="en-US" altLang="zh-CN">
+              <a:ea typeface="黑体" pitchFamily="49" charset="-122"/>
+            </a:endParaRPr>
           </a:p>
         </p:txBody>
       </p:sp>
     </p:spTree>
     <p:extLst>
       <p:ext uri="{BB962C8B-B14F-4D97-AF65-F5344CB8AC3E}">
-        <p14:creationId xmlns:p14="http://schemas.microsoft.com/office/powerpoint/2010/main" val="748942149"/>
+        <p14:creationId xmlns:p14="http://schemas.microsoft.com/office/powerpoint/2010/main" val="903667938"/>
       </p:ext>
     </p:extLst>
   </p:cSld>
@@ -3312,6 +3308,95 @@
       </p:grpSpPr>
       <p:sp>
         <p:nvSpPr>
+          <p:cNvPr id="2" name="幻灯片图像占位符 1"/>
+          <p:cNvSpPr>
+            <a:spLocks noGrp="1" noRot="1" noChangeAspect="1"/>
+          </p:cNvSpPr>
+          <p:nvPr>
+            <p:ph type="sldImg"/>
+          </p:nvPr>
+        </p:nvSpPr>
+        <p:spPr/>
+      </p:sp>
+      <p:sp>
+        <p:nvSpPr>
+          <p:cNvPr id="3" name="备注占位符 2"/>
+          <p:cNvSpPr>
+            <a:spLocks noGrp="1"/>
+          </p:cNvSpPr>
+          <p:nvPr>
+            <p:ph type="body" idx="1"/>
+          </p:nvPr>
+        </p:nvSpPr>
+        <p:spPr/>
+        <p:txBody>
+          <a:bodyPr/>
+          <a:lstStyle/>
+          <a:p>
+            <a:r>
+              <a:rPr lang="en-US" altLang="zh-CN"/>
+              <a:t>2021.0531</a:t>
+            </a:r>
+            <a:endParaRPr lang="zh-CN" altLang="en-US" dirty="0"/>
+          </a:p>
+        </p:txBody>
+      </p:sp>
+      <p:sp>
+        <p:nvSpPr>
+          <p:cNvPr id="4" name="灯片编号占位符 3"/>
+          <p:cNvSpPr>
+            <a:spLocks noGrp="1"/>
+          </p:cNvSpPr>
+          <p:nvPr>
+            <p:ph type="sldNum" sz="quarter" idx="10"/>
+          </p:nvPr>
+        </p:nvSpPr>
+        <p:spPr/>
+        <p:txBody>
+          <a:bodyPr/>
+          <a:lstStyle/>
+          <a:p>
+            <a:fld id="{D50AF6DD-051E-413B-8808-23D5AB3BD9E4}" type="slidenum">
+              <a:rPr lang="en-US" smtClean="0"/>
+              <a:pPr/>
+              <a:t>84</a:t>
+            </a:fld>
+            <a:endParaRPr lang="en-US"/>
+          </a:p>
+        </p:txBody>
+      </p:sp>
+    </p:spTree>
+    <p:extLst>
+      <p:ext uri="{BB962C8B-B14F-4D97-AF65-F5344CB8AC3E}">
+        <p14:creationId xmlns:p14="http://schemas.microsoft.com/office/powerpoint/2010/main" val="748942149"/>
+      </p:ext>
+    </p:extLst>
+  </p:cSld>
+  <p:clrMapOvr>
+    <a:masterClrMapping/>
+  </p:clrMapOvr>
+</p:notes>
+</file>
+
+<file path=ppt/notesSlides/notesSlide32.xml><?xml version="1.0" encoding="utf-8"?>
+<p:notes xmlns:a="http://schemas.openxmlformats.org/drawingml/2006/main" xmlns:r="http://schemas.openxmlformats.org/officeDocument/2006/relationships" xmlns:p="http://schemas.openxmlformats.org/presentationml/2006/main">
+  <p:cSld>
+    <p:spTree>
+      <p:nvGrpSpPr>
+        <p:cNvPr id="1" name=""/>
+        <p:cNvGrpSpPr/>
+        <p:nvPr/>
+      </p:nvGrpSpPr>
+      <p:grpSpPr>
+        <a:xfrm>
+          <a:off x="0" y="0"/>
+          <a:ext cx="0" cy="0"/>
+          <a:chOff x="0" y="0"/>
+          <a:chExt cx="0" cy="0"/>
+        </a:xfrm>
+      </p:grpSpPr>
+      <p:sp>
+        <p:nvSpPr>
           <p:cNvPr id="160770" name="幻灯片图像占位符 1"/>
           <p:cNvSpPr>
             <a:spLocks noGrp="1" noRot="1" noChangeAspect="1" noTextEdit="1"/>
@@ -3391,7 +3476,7 @@
 </p:notes>
 </file>
 
-<file path=ppt/notesSlides/notesSlide32.xml><?xml version="1.0" encoding="utf-8"?>
+<file path=ppt/notesSlides/notesSlide33.xml><?xml version="1.0" encoding="utf-8"?>
 <p:notes xmlns:a="http://schemas.openxmlformats.org/drawingml/2006/main" xmlns:r="http://schemas.openxmlformats.org/officeDocument/2006/relationships" xmlns:p="http://schemas.openxmlformats.org/presentationml/2006/main">
   <p:cSld>
     <p:spTree>
@@ -4239,7 +4324,7 @@
             <a:fld id="{535101B3-0010-49BE-8236-66B90211FF04}" type="datetime1">
               <a:rPr lang="en-US" altLang="zh-CN" smtClean="0"/>
               <a:pPr/>
-              <a:t>6/12/22</a:t>
+              <a:t>6/14/22</a:t>
             </a:fld>
             <a:endParaRPr lang="en-US"/>
           </a:p>
@@ -4592,7 +4677,7 @@
             <a:fld id="{8C97D574-52BE-4187-8AF7-E201A70CB6DC}" type="datetime1">
               <a:rPr lang="en-US" altLang="zh-CN" smtClean="0"/>
               <a:pPr/>
-              <a:t>6/12/22</a:t>
+              <a:t>6/14/22</a:t>
             </a:fld>
             <a:endParaRPr lang="en-US"/>
           </a:p>
@@ -4768,7 +4853,7 @@
             <a:fld id="{06CC6442-F0BB-4DBA-B030-4A0192701801}" type="datetime1">
               <a:rPr lang="en-US" altLang="zh-CN" smtClean="0"/>
               <a:pPr/>
-              <a:t>6/12/22</a:t>
+              <a:t>6/14/22</a:t>
             </a:fld>
             <a:endParaRPr lang="en-US"/>
           </a:p>
@@ -4894,7 +4979,7 @@
             <a:fld id="{79694328-A6FB-477A-B9C5-7FEFDBDE1042}" type="datetime1">
               <a:rPr lang="en-US" altLang="zh-CN" smtClean="0"/>
               <a:pPr/>
-              <a:t>6/12/22</a:t>
+              <a:t>6/14/22</a:t>
             </a:fld>
             <a:endParaRPr lang="en-US"/>
           </a:p>
@@ -5296,7 +5381,7 @@
             <a:fld id="{25629C65-C267-4342-9116-A00B6E7C55AD}" type="datetime1">
               <a:rPr lang="en-US" altLang="zh-CN" smtClean="0"/>
               <a:pPr/>
-              <a:t>6/12/22</a:t>
+              <a:t>6/14/22</a:t>
             </a:fld>
             <a:endParaRPr lang="en-US"/>
           </a:p>
@@ -5562,7 +5647,7 @@
             <a:fld id="{BC48BA6D-2268-450C-9E6F-6553A2809D14}" type="datetime1">
               <a:rPr lang="en-US" altLang="zh-CN" smtClean="0"/>
               <a:pPr/>
-              <a:t>6/12/22</a:t>
+              <a:t>6/14/22</a:t>
             </a:fld>
             <a:endParaRPr lang="en-US"/>
           </a:p>
@@ -5925,7 +6010,7 @@
             <a:fld id="{81976173-FFAF-40B2-BD71-0C474124F5CA}" type="datetime1">
               <a:rPr lang="en-US" altLang="zh-CN" smtClean="0"/>
               <a:pPr/>
-              <a:t>6/12/22</a:t>
+              <a:t>6/14/22</a:t>
             </a:fld>
             <a:endParaRPr lang="en-US"/>
           </a:p>
@@ -6153,7 +6238,7 @@
             <a:fld id="{02EAAC5F-3C7D-47E2-8137-0D0E13270C17}" type="datetime1">
               <a:rPr lang="en-US" altLang="zh-CN" smtClean="0"/>
               <a:pPr/>
-              <a:t>6/12/22</a:t>
+              <a:t>6/14/22</a:t>
             </a:fld>
             <a:endParaRPr lang="en-US"/>
           </a:p>
@@ -6245,7 +6330,7 @@
             <a:fld id="{89B44C75-2845-4A49-8407-B10E57DDCB66}" type="datetime1">
               <a:rPr lang="en-US" altLang="zh-CN" smtClean="0"/>
               <a:pPr/>
-              <a:t>6/12/22</a:t>
+              <a:t>6/14/22</a:t>
             </a:fld>
             <a:endParaRPr lang="en-US"/>
           </a:p>
@@ -6513,7 +6598,7 @@
             <a:fld id="{A49D93C6-C0E5-4C94-83B0-EBE524181AA9}" type="datetime1">
               <a:rPr lang="en-US" altLang="zh-CN" smtClean="0"/>
               <a:pPr/>
-              <a:t>6/12/22</a:t>
+              <a:t>6/14/22</a:t>
             </a:fld>
             <a:endParaRPr lang="en-US"/>
           </a:p>
@@ -6742,7 +6827,7 @@
             <a:fld id="{D5A46CFF-7119-486E-A242-14937EB72380}" type="datetime1">
               <a:rPr lang="en-US" altLang="zh-CN" smtClean="0"/>
               <a:pPr/>
-              <a:t>6/12/22</a:t>
+              <a:t>6/14/22</a:t>
             </a:fld>
             <a:endParaRPr lang="en-US"/>
           </a:p>
@@ -7241,7 +7326,7 @@
             <a:fld id="{917F057F-A64E-4BDF-9C5A-7B9C1755BBD0}" type="datetime1">
               <a:rPr lang="en-US" altLang="zh-CN" smtClean="0"/>
               <a:pPr/>
-              <a:t>6/12/22</a:t>
+              <a:t>6/14/22</a:t>
             </a:fld>
             <a:endParaRPr lang="en-US"/>
           </a:p>
@@ -8675,7 +8760,7 @@
           <a:graphicData uri="http://schemas.openxmlformats.org/presentationml/2006/ole">
             <mc:AlternateContent xmlns:mc="http://schemas.openxmlformats.org/markup-compatibility/2006">
               <mc:Choice xmlns:v="urn:schemas-microsoft-com:vml" Requires="v">
-                <p:oleObj spid="_x0000_s388246" name="公式" r:id="rId4" imgW="761760" imgH="177480" progId="Equation.3">
+                <p:oleObj spid="_x0000_s388248" name="公式" r:id="rId4" imgW="761760" imgH="177480" progId="Equation.3">
                   <p:embed/>
                 </p:oleObj>
               </mc:Choice>
@@ -8772,7 +8857,7 @@
           <a:graphicData uri="http://schemas.openxmlformats.org/presentationml/2006/ole">
             <mc:AlternateContent xmlns:mc="http://schemas.openxmlformats.org/markup-compatibility/2006">
               <mc:Choice xmlns:v="urn:schemas-microsoft-com:vml" Requires="v">
-                <p:oleObj spid="_x0000_s388247" name="公式" r:id="rId6" imgW="253800" imgH="444240" progId="Equation.3">
+                <p:oleObj spid="_x0000_s388249" name="公式" r:id="rId6" imgW="253800" imgH="444240" progId="Equation.3">
                   <p:embed/>
                 </p:oleObj>
               </mc:Choice>
@@ -9214,7 +9299,7 @@
           <a:graphicData uri="http://schemas.openxmlformats.org/presentationml/2006/ole">
             <mc:AlternateContent xmlns:mc="http://schemas.openxmlformats.org/markup-compatibility/2006">
               <mc:Choice xmlns:v="urn:schemas-microsoft-com:vml" Requires="v">
-                <p:oleObj spid="_x0000_s389422" name="公式" r:id="rId3" imgW="1384200" imgH="228600" progId="Equation.3">
+                <p:oleObj spid="_x0000_s389426" name="公式" r:id="rId3" imgW="1384200" imgH="228600" progId="Equation.3">
                   <p:embed/>
                 </p:oleObj>
               </mc:Choice>
@@ -9290,7 +9375,7 @@
           <a:graphicData uri="http://schemas.openxmlformats.org/presentationml/2006/ole">
             <mc:AlternateContent xmlns:mc="http://schemas.openxmlformats.org/markup-compatibility/2006">
               <mc:Choice xmlns:v="urn:schemas-microsoft-com:vml" Requires="v">
-                <p:oleObj spid="_x0000_s389423" name="公式" r:id="rId5" imgW="2514600" imgH="241200" progId="Equation.3">
+                <p:oleObj spid="_x0000_s389427" name="公式" r:id="rId5" imgW="2514600" imgH="241200" progId="Equation.3">
                   <p:embed/>
                 </p:oleObj>
               </mc:Choice>
@@ -9366,7 +9451,7 @@
           <a:graphicData uri="http://schemas.openxmlformats.org/presentationml/2006/ole">
             <mc:AlternateContent xmlns:mc="http://schemas.openxmlformats.org/markup-compatibility/2006">
               <mc:Choice xmlns:v="urn:schemas-microsoft-com:vml" Requires="v">
-                <p:oleObj spid="_x0000_s389424" name="公式" r:id="rId7" imgW="1460160" imgH="228600" progId="Equation.3">
+                <p:oleObj spid="_x0000_s389428" name="公式" r:id="rId7" imgW="1460160" imgH="228600" progId="Equation.3">
                   <p:embed/>
                 </p:oleObj>
               </mc:Choice>
@@ -9442,7 +9527,7 @@
           <a:graphicData uri="http://schemas.openxmlformats.org/presentationml/2006/ole">
             <mc:AlternateContent xmlns:mc="http://schemas.openxmlformats.org/markup-compatibility/2006">
               <mc:Choice xmlns:v="urn:schemas-microsoft-com:vml" Requires="v">
-                <p:oleObj spid="_x0000_s389425" name="公式" r:id="rId9" imgW="863280" imgH="203040" progId="Equation.3">
+                <p:oleObj spid="_x0000_s389429" name="公式" r:id="rId9" imgW="863280" imgH="203040" progId="Equation.3">
                   <p:embed/>
                 </p:oleObj>
               </mc:Choice>
@@ -9710,7 +9795,7 @@
           <a:graphicData uri="http://schemas.openxmlformats.org/presentationml/2006/ole">
             <mc:AlternateContent xmlns:mc="http://schemas.openxmlformats.org/markup-compatibility/2006">
               <mc:Choice xmlns:v="urn:schemas-microsoft-com:vml" Requires="v">
-                <p:oleObj spid="_x0000_s390294" name="公式" r:id="rId3" imgW="1066680" imgH="317160" progId="Equation.3">
+                <p:oleObj spid="_x0000_s390296" name="公式" r:id="rId3" imgW="1066680" imgH="317160" progId="Equation.3">
                   <p:embed/>
                 </p:oleObj>
               </mc:Choice>
@@ -9780,7 +9865,7 @@
           <a:graphicData uri="http://schemas.openxmlformats.org/presentationml/2006/ole">
             <mc:AlternateContent xmlns:mc="http://schemas.openxmlformats.org/markup-compatibility/2006">
               <mc:Choice xmlns:v="urn:schemas-microsoft-com:vml" Requires="v">
-                <p:oleObj spid="_x0000_s390295" name="公式" r:id="rId5" imgW="660240" imgH="368280" progId="Equation.3">
+                <p:oleObj spid="_x0000_s390297" name="公式" r:id="rId5" imgW="660240" imgH="368280" progId="Equation.3">
                   <p:embed/>
                 </p:oleObj>
               </mc:Choice>
@@ -9930,7 +10015,7 @@
           <a:graphicData uri="http://schemas.openxmlformats.org/presentationml/2006/ole">
             <mc:AlternateContent xmlns:mc="http://schemas.openxmlformats.org/markup-compatibility/2006">
               <mc:Choice xmlns:v="urn:schemas-microsoft-com:vml" Requires="v">
-                <p:oleObj spid="_x0000_s391318" name="公式" r:id="rId3" imgW="1371600" imgH="533160" progId="Equation.3">
+                <p:oleObj spid="_x0000_s391320" name="公式" r:id="rId3" imgW="1371600" imgH="533160" progId="Equation.3">
                   <p:embed/>
                 </p:oleObj>
               </mc:Choice>
@@ -10000,7 +10085,7 @@
           <a:graphicData uri="http://schemas.openxmlformats.org/presentationml/2006/ole">
             <mc:AlternateContent xmlns:mc="http://schemas.openxmlformats.org/markup-compatibility/2006">
               <mc:Choice xmlns:v="urn:schemas-microsoft-com:vml" Requires="v">
-                <p:oleObj spid="_x0000_s391319" name="公式" r:id="rId5" imgW="1333440" imgH="507960" progId="Equation.3">
+                <p:oleObj spid="_x0000_s391321" name="公式" r:id="rId5" imgW="1333440" imgH="507960" progId="Equation.3">
                   <p:embed/>
                 </p:oleObj>
               </mc:Choice>
@@ -11001,7 +11086,7 @@
           <a:graphicData uri="http://schemas.openxmlformats.org/presentationml/2006/ole">
             <mc:AlternateContent xmlns:mc="http://schemas.openxmlformats.org/markup-compatibility/2006">
               <mc:Choice xmlns:v="urn:schemas-microsoft-com:vml" Requires="v">
-                <p:oleObj spid="_x0000_s392269" name="公式" r:id="rId3" imgW="152280" imgH="228600" progId="Equation.3">
+                <p:oleObj spid="_x0000_s392270" name="公式" r:id="rId3" imgW="152280" imgH="228600" progId="Equation.3">
                   <p:embed/>
                 </p:oleObj>
               </mc:Choice>
@@ -11216,7 +11301,7 @@
           <a:graphicData uri="http://schemas.openxmlformats.org/presentationml/2006/ole">
             <mc:AlternateContent xmlns:mc="http://schemas.openxmlformats.org/markup-compatibility/2006">
               <mc:Choice xmlns:v="urn:schemas-microsoft-com:vml" Requires="v">
-                <p:oleObj spid="_x0000_s393292" name="公式" r:id="rId4" imgW="520560" imgH="1320480" progId="Equation.3">
+                <p:oleObj spid="_x0000_s393293" name="公式" r:id="rId4" imgW="520560" imgH="1320480" progId="Equation.3">
                   <p:embed/>
                 </p:oleObj>
               </mc:Choice>
@@ -11366,7 +11451,7 @@
           <a:graphicData uri="http://schemas.openxmlformats.org/presentationml/2006/ole">
             <mc:AlternateContent xmlns:mc="http://schemas.openxmlformats.org/markup-compatibility/2006">
               <mc:Choice xmlns:v="urn:schemas-microsoft-com:vml" Requires="v">
-                <p:oleObj spid="_x0000_s394316" name="公式" r:id="rId3" imgW="2425680" imgH="1993680" progId="Equation.3">
+                <p:oleObj spid="_x0000_s394317" name="公式" r:id="rId3" imgW="2425680" imgH="1993680" progId="Equation.3">
                   <p:embed/>
                 </p:oleObj>
               </mc:Choice>
@@ -11555,7 +11640,7 @@
           <a:graphicData uri="http://schemas.openxmlformats.org/presentationml/2006/ole">
             <mc:AlternateContent xmlns:mc="http://schemas.openxmlformats.org/markup-compatibility/2006">
               <mc:Choice xmlns:v="urn:schemas-microsoft-com:vml" Requires="v">
-                <p:oleObj spid="_x0000_s395570" name="公式" r:id="rId3" imgW="330120" imgH="304560" progId="Equation.3">
+                <p:oleObj spid="_x0000_s395574" name="公式" r:id="rId3" imgW="330120" imgH="304560" progId="Equation.3">
                   <p:embed/>
                 </p:oleObj>
               </mc:Choice>
@@ -11622,7 +11707,7 @@
           <a:graphicData uri="http://schemas.openxmlformats.org/presentationml/2006/ole">
             <mc:AlternateContent xmlns:mc="http://schemas.openxmlformats.org/markup-compatibility/2006">
               <mc:Choice xmlns:v="urn:schemas-microsoft-com:vml" Requires="v">
-                <p:oleObj spid="_x0000_s395571" name="公式" r:id="rId5" imgW="190440" imgH="266400" progId="Equation.3">
+                <p:oleObj spid="_x0000_s395575" name="公式" r:id="rId5" imgW="190440" imgH="266400" progId="Equation.3">
                   <p:embed/>
                 </p:oleObj>
               </mc:Choice>
@@ -11698,7 +11783,7 @@
           <a:graphicData uri="http://schemas.openxmlformats.org/presentationml/2006/ole">
             <mc:AlternateContent xmlns:mc="http://schemas.openxmlformats.org/markup-compatibility/2006">
               <mc:Choice xmlns:v="urn:schemas-microsoft-com:vml" Requires="v">
-                <p:oleObj spid="_x0000_s395572" name="公式" r:id="rId7" imgW="380880" imgH="279360" progId="Equation.3">
+                <p:oleObj spid="_x0000_s395576" name="公式" r:id="rId7" imgW="380880" imgH="279360" progId="Equation.3">
                   <p:embed/>
                 </p:oleObj>
               </mc:Choice>
@@ -11774,7 +11859,7 @@
           <a:graphicData uri="http://schemas.openxmlformats.org/presentationml/2006/ole">
             <mc:AlternateContent xmlns:mc="http://schemas.openxmlformats.org/markup-compatibility/2006">
               <mc:Choice xmlns:v="urn:schemas-microsoft-com:vml" Requires="v">
-                <p:oleObj spid="_x0000_s395573" name="公式" r:id="rId9" imgW="2768400" imgH="660240" progId="Equation.3">
+                <p:oleObj spid="_x0000_s395577" name="公式" r:id="rId9" imgW="2768400" imgH="660240" progId="Equation.3">
                   <p:embed/>
                 </p:oleObj>
               </mc:Choice>
@@ -12714,7 +12799,7 @@
           <a:graphicData uri="http://schemas.openxmlformats.org/presentationml/2006/ole">
             <mc:AlternateContent xmlns:mc="http://schemas.openxmlformats.org/markup-compatibility/2006">
               <mc:Choice xmlns:v="urn:schemas-microsoft-com:vml" Requires="v">
-                <p:oleObj spid="_x0000_s396586" name="公式" r:id="rId4" imgW="736560" imgH="177480" progId="Equation.3">
+                <p:oleObj spid="_x0000_s396590" name="公式" r:id="rId4" imgW="736560" imgH="177480" progId="Equation.3">
                   <p:embed/>
                 </p:oleObj>
               </mc:Choice>
@@ -12811,7 +12896,7 @@
           <a:graphicData uri="http://schemas.openxmlformats.org/presentationml/2006/ole">
             <mc:AlternateContent xmlns:mc="http://schemas.openxmlformats.org/markup-compatibility/2006">
               <mc:Choice xmlns:v="urn:schemas-microsoft-com:vml" Requires="v">
-                <p:oleObj spid="_x0000_s396587" name="公式" r:id="rId6" imgW="253800" imgH="444240" progId="Equation.3">
+                <p:oleObj spid="_x0000_s396591" name="公式" r:id="rId6" imgW="253800" imgH="444240" progId="Equation.3">
                   <p:embed/>
                 </p:oleObj>
               </mc:Choice>
@@ -12982,7 +13067,7 @@
           <a:graphicData uri="http://schemas.openxmlformats.org/presentationml/2006/ole">
             <mc:AlternateContent xmlns:mc="http://schemas.openxmlformats.org/markup-compatibility/2006">
               <mc:Choice xmlns:v="urn:schemas-microsoft-com:vml" Requires="v">
-                <p:oleObj spid="_x0000_s396588" name="公式" r:id="rId8" imgW="711000" imgH="177480" progId="Equation.3">
+                <p:oleObj spid="_x0000_s396592" name="公式" r:id="rId8" imgW="711000" imgH="177480" progId="Equation.3">
                   <p:embed/>
                 </p:oleObj>
               </mc:Choice>
@@ -13052,7 +13137,7 @@
           <a:graphicData uri="http://schemas.openxmlformats.org/presentationml/2006/ole">
             <mc:AlternateContent xmlns:mc="http://schemas.openxmlformats.org/markup-compatibility/2006">
               <mc:Choice xmlns:v="urn:schemas-microsoft-com:vml" Requires="v">
-                <p:oleObj spid="_x0000_s396589" name="公式" r:id="rId10" imgW="812520" imgH="177480" progId="Equation.3">
+                <p:oleObj spid="_x0000_s396593" name="公式" r:id="rId10" imgW="812520" imgH="177480" progId="Equation.3">
                   <p:embed/>
                 </p:oleObj>
               </mc:Choice>
@@ -13258,7 +13343,7 @@
           <a:graphicData uri="http://schemas.openxmlformats.org/presentationml/2006/ole">
             <mc:AlternateContent xmlns:mc="http://schemas.openxmlformats.org/markup-compatibility/2006">
               <mc:Choice xmlns:v="urn:schemas-microsoft-com:vml" Requires="v">
-                <p:oleObj spid="_x0000_s398518" name="公式" r:id="rId4" imgW="3746160" imgH="698400" progId="Equation.3">
+                <p:oleObj spid="_x0000_s398521" name="公式" r:id="rId4" imgW="3746160" imgH="698400" progId="Equation.3">
                   <p:embed/>
                 </p:oleObj>
               </mc:Choice>
@@ -13319,7 +13404,7 @@
           <a:graphicData uri="http://schemas.openxmlformats.org/presentationml/2006/ole">
             <mc:AlternateContent xmlns:mc="http://schemas.openxmlformats.org/markup-compatibility/2006">
               <mc:Choice xmlns:v="urn:schemas-microsoft-com:vml" Requires="v">
-                <p:oleObj spid="_x0000_s398519" name="公式" r:id="rId6" imgW="2768400" imgH="660240" progId="Equation.3">
+                <p:oleObj spid="_x0000_s398522" name="公式" r:id="rId6" imgW="2768400" imgH="660240" progId="Equation.3">
                   <p:embed/>
                 </p:oleObj>
               </mc:Choice>
@@ -13389,7 +13474,7 @@
           <a:graphicData uri="http://schemas.openxmlformats.org/presentationml/2006/ole">
             <mc:AlternateContent xmlns:mc="http://schemas.openxmlformats.org/markup-compatibility/2006">
               <mc:Choice xmlns:v="urn:schemas-microsoft-com:vml" Requires="v">
-                <p:oleObj spid="_x0000_s398520" name="公式" r:id="rId8" imgW="1523880" imgH="228600" progId="Equation.3">
+                <p:oleObj spid="_x0000_s398523" name="公式" r:id="rId8" imgW="1523880" imgH="228600" progId="Equation.3">
                   <p:embed/>
                 </p:oleObj>
               </mc:Choice>
@@ -13833,7 +13918,7 @@
           <a:graphicData uri="http://schemas.openxmlformats.org/presentationml/2006/ole">
             <mc:AlternateContent xmlns:mc="http://schemas.openxmlformats.org/markup-compatibility/2006">
               <mc:Choice xmlns:v="urn:schemas-microsoft-com:vml" Requires="v">
-                <p:oleObj spid="_x0000_s447586" name="公式" r:id="rId4" imgW="3111480" imgH="444240" progId="Equation.3">
+                <p:oleObj spid="_x0000_s447589" name="公式" r:id="rId4" imgW="3111480" imgH="444240" progId="Equation.3">
                   <p:embed/>
                 </p:oleObj>
               </mc:Choice>
@@ -13923,7 +14008,7 @@
           <a:graphicData uri="http://schemas.openxmlformats.org/presentationml/2006/ole">
             <mc:AlternateContent xmlns:mc="http://schemas.openxmlformats.org/markup-compatibility/2006">
               <mc:Choice xmlns:v="urn:schemas-microsoft-com:vml" Requires="v">
-                <p:oleObj spid="_x0000_s447587" name="公式" r:id="rId6" imgW="3149280" imgH="660240" progId="Equation.3">
+                <p:oleObj spid="_x0000_s447590" name="公式" r:id="rId6" imgW="3149280" imgH="660240" progId="Equation.3">
                   <p:embed/>
                 </p:oleObj>
               </mc:Choice>
@@ -13984,7 +14069,7 @@
           <a:graphicData uri="http://schemas.openxmlformats.org/presentationml/2006/ole">
             <mc:AlternateContent xmlns:mc="http://schemas.openxmlformats.org/markup-compatibility/2006">
               <mc:Choice xmlns:v="urn:schemas-microsoft-com:vml" Requires="v">
-                <p:oleObj spid="_x0000_s447588" name="公式" r:id="rId8" imgW="2806560" imgH="291960" progId="Equation.3">
+                <p:oleObj spid="_x0000_s447591" name="公式" r:id="rId8" imgW="2806560" imgH="291960" progId="Equation.3">
                   <p:embed/>
                 </p:oleObj>
               </mc:Choice>
@@ -14517,7 +14602,7 @@
           <a:graphicData uri="http://schemas.openxmlformats.org/presentationml/2006/ole">
             <mc:AlternateContent xmlns:mc="http://schemas.openxmlformats.org/markup-compatibility/2006">
               <mc:Choice xmlns:v="urn:schemas-microsoft-com:vml" Requires="v">
-                <p:oleObj spid="_x0000_s448598" name="公式" r:id="rId4" imgW="1282680" imgH="291960" progId="Equation.3">
+                <p:oleObj spid="_x0000_s448601" name="公式" r:id="rId4" imgW="1282680" imgH="291960" progId="Equation.3">
                   <p:embed/>
                 </p:oleObj>
               </mc:Choice>
@@ -14578,7 +14663,7 @@
           <a:graphicData uri="http://schemas.openxmlformats.org/presentationml/2006/ole">
             <mc:AlternateContent xmlns:mc="http://schemas.openxmlformats.org/markup-compatibility/2006">
               <mc:Choice xmlns:v="urn:schemas-microsoft-com:vml" Requires="v">
-                <p:oleObj spid="_x0000_s448599" name="公式" r:id="rId6" imgW="3047760" imgH="291960" progId="Equation.3">
+                <p:oleObj spid="_x0000_s448602" name="公式" r:id="rId6" imgW="3047760" imgH="291960" progId="Equation.3">
                   <p:embed/>
                 </p:oleObj>
               </mc:Choice>
@@ -14639,7 +14724,7 @@
           <a:graphicData uri="http://schemas.openxmlformats.org/presentationml/2006/ole">
             <mc:AlternateContent xmlns:mc="http://schemas.openxmlformats.org/markup-compatibility/2006">
               <mc:Choice xmlns:v="urn:schemas-microsoft-com:vml" Requires="v">
-                <p:oleObj spid="_x0000_s448600" name="公式" r:id="rId8" imgW="2755800" imgH="291960" progId="Equation.3">
+                <p:oleObj spid="_x0000_s448603" name="公式" r:id="rId8" imgW="2755800" imgH="291960" progId="Equation.3">
                   <p:embed/>
                 </p:oleObj>
               </mc:Choice>
@@ -14994,7 +15079,7 @@
           <a:graphicData uri="http://schemas.openxmlformats.org/presentationml/2006/ole">
             <mc:AlternateContent xmlns:mc="http://schemas.openxmlformats.org/markup-compatibility/2006">
               <mc:Choice xmlns:v="urn:schemas-microsoft-com:vml" Requires="v">
-                <p:oleObj spid="_x0000_s449589" name="公式" r:id="rId4" imgW="3619440" imgH="965160" progId="Equation.3">
+                <p:oleObj spid="_x0000_s449591" name="公式" r:id="rId4" imgW="3619440" imgH="965160" progId="Equation.3">
                   <p:embed/>
                 </p:oleObj>
               </mc:Choice>
@@ -15055,7 +15140,7 @@
           <a:graphicData uri="http://schemas.openxmlformats.org/presentationml/2006/ole">
             <mc:AlternateContent xmlns:mc="http://schemas.openxmlformats.org/markup-compatibility/2006">
               <mc:Choice xmlns:v="urn:schemas-microsoft-com:vml" Requires="v">
-                <p:oleObj spid="_x0000_s449590" name="公式" r:id="rId6" imgW="1904760" imgH="1422360" progId="Equation.3">
+                <p:oleObj spid="_x0000_s449592" name="公式" r:id="rId6" imgW="1904760" imgH="1422360" progId="Equation.3">
                   <p:embed/>
                 </p:oleObj>
               </mc:Choice>
@@ -15309,7 +15394,7 @@
           <a:graphicData uri="http://schemas.openxmlformats.org/presentationml/2006/ole">
             <mc:AlternateContent xmlns:mc="http://schemas.openxmlformats.org/markup-compatibility/2006">
               <mc:Choice xmlns:v="urn:schemas-microsoft-com:vml" Requires="v">
-                <p:oleObj spid="_x0000_s399512" name="公式" r:id="rId3" imgW="2349360" imgH="888840" progId="Equation.3">
+                <p:oleObj spid="_x0000_s399514" name="公式" r:id="rId3" imgW="2349360" imgH="888840" progId="Equation.3">
                   <p:embed/>
                 </p:oleObj>
               </mc:Choice>
@@ -15376,7 +15461,7 @@
           <a:graphicData uri="http://schemas.openxmlformats.org/presentationml/2006/ole">
             <mc:AlternateContent xmlns:mc="http://schemas.openxmlformats.org/markup-compatibility/2006">
               <mc:Choice xmlns:v="urn:schemas-microsoft-com:vml" Requires="v">
-                <p:oleObj spid="_x0000_s399513" name="公式" r:id="rId5" imgW="2920680" imgH="482400" progId="Equation.3">
+                <p:oleObj spid="_x0000_s399515" name="公式" r:id="rId5" imgW="2920680" imgH="482400" progId="Equation.3">
                   <p:embed/>
                 </p:oleObj>
               </mc:Choice>
@@ -15515,7 +15600,7 @@
           <a:graphicData uri="http://schemas.openxmlformats.org/presentationml/2006/ole">
             <mc:AlternateContent xmlns:mc="http://schemas.openxmlformats.org/markup-compatibility/2006">
               <mc:Choice xmlns:v="urn:schemas-microsoft-com:vml" Requires="v">
-                <p:oleObj spid="_x0000_s400460" name="公式" r:id="rId3" imgW="2247840" imgH="1130040" progId="Equation.3">
+                <p:oleObj spid="_x0000_s400461" name="公式" r:id="rId3" imgW="2247840" imgH="1130040" progId="Equation.3">
                   <p:embed/>
                 </p:oleObj>
               </mc:Choice>
@@ -15651,7 +15736,7 @@
           <a:graphicData uri="http://schemas.openxmlformats.org/presentationml/2006/ole">
             <mc:AlternateContent xmlns:mc="http://schemas.openxmlformats.org/markup-compatibility/2006">
               <mc:Choice xmlns:v="urn:schemas-microsoft-com:vml" Requires="v">
-                <p:oleObj spid="_x0000_s450602" name="公式" r:id="rId3" imgW="1904760" imgH="711000" progId="Equation.3">
+                <p:oleObj spid="_x0000_s450604" name="公式" r:id="rId3" imgW="1904760" imgH="711000" progId="Equation.3">
                   <p:embed/>
                 </p:oleObj>
               </mc:Choice>
@@ -15717,7 +15802,7 @@
           <a:graphicData uri="http://schemas.openxmlformats.org/presentationml/2006/ole">
             <mc:AlternateContent xmlns:mc="http://schemas.openxmlformats.org/markup-compatibility/2006">
               <mc:Choice xmlns:v="urn:schemas-microsoft-com:vml" Requires="v">
-                <p:oleObj spid="_x0000_s450603" name="公式" r:id="rId5" imgW="2705040" imgH="2108160" progId="Equation.3">
+                <p:oleObj spid="_x0000_s450605" name="公式" r:id="rId5" imgW="2705040" imgH="2108160" progId="Equation.3">
                   <p:embed/>
                 </p:oleObj>
               </mc:Choice>
@@ -15958,7 +16043,7 @@
           <a:graphicData uri="http://schemas.openxmlformats.org/presentationml/2006/ole">
             <mc:AlternateContent xmlns:mc="http://schemas.openxmlformats.org/markup-compatibility/2006">
               <mc:Choice xmlns:v="urn:schemas-microsoft-com:vml" Requires="v">
-                <p:oleObj spid="_x0000_s402530" name="公式" r:id="rId3" imgW="3238200" imgH="2311200" progId="Equation.3">
+                <p:oleObj spid="_x0000_s402532" name="公式" r:id="rId3" imgW="3238200" imgH="2311200" progId="Equation.3">
                   <p:embed/>
                 </p:oleObj>
               </mc:Choice>
@@ -16028,7 +16113,7 @@
           <a:graphicData uri="http://schemas.openxmlformats.org/presentationml/2006/ole">
             <mc:AlternateContent xmlns:mc="http://schemas.openxmlformats.org/markup-compatibility/2006">
               <mc:Choice xmlns:v="urn:schemas-microsoft-com:vml" Requires="v">
-                <p:oleObj spid="_x0000_s402531" name="公式" r:id="rId5" imgW="1904760" imgH="1422360" progId="Equation.3">
+                <p:oleObj spid="_x0000_s402533" name="公式" r:id="rId5" imgW="1904760" imgH="1422360" progId="Equation.3">
                   <p:embed/>
                 </p:oleObj>
               </mc:Choice>
@@ -16484,7 +16569,7 @@
           <a:graphicData uri="http://schemas.openxmlformats.org/presentationml/2006/ole">
             <mc:AlternateContent xmlns:mc="http://schemas.openxmlformats.org/markup-compatibility/2006">
               <mc:Choice xmlns:v="urn:schemas-microsoft-com:vml" Requires="v">
-                <p:oleObj spid="_x0000_s403532" name="公式" r:id="rId3" imgW="2247840" imgH="1130040" progId="Equation.3">
+                <p:oleObj spid="_x0000_s403533" name="公式" r:id="rId3" imgW="2247840" imgH="1130040" progId="Equation.3">
                   <p:embed/>
                 </p:oleObj>
               </mc:Choice>
@@ -16749,7 +16834,7 @@
           <a:graphicData uri="http://schemas.openxmlformats.org/presentationml/2006/ole">
             <mc:AlternateContent xmlns:mc="http://schemas.openxmlformats.org/markup-compatibility/2006">
               <mc:Choice xmlns:v="urn:schemas-microsoft-com:vml" Requires="v">
-                <p:oleObj spid="_x0000_s404556" name="公式" r:id="rId3" imgW="2882880" imgH="1549080" progId="Equation.3">
+                <p:oleObj spid="_x0000_s404557" name="公式" r:id="rId3" imgW="2882880" imgH="1549080" progId="Equation.3">
                   <p:embed/>
                 </p:oleObj>
               </mc:Choice>
@@ -16880,7 +16965,7 @@
           <a:graphicData uri="http://schemas.openxmlformats.org/presentationml/2006/ole">
             <mc:AlternateContent xmlns:mc="http://schemas.openxmlformats.org/markup-compatibility/2006">
               <mc:Choice xmlns:v="urn:schemas-microsoft-com:vml" Requires="v">
-                <p:oleObj spid="_x0000_s405580" name="公式" r:id="rId3" imgW="2781000" imgH="1574640" progId="Equation.3">
+                <p:oleObj spid="_x0000_s405581" name="公式" r:id="rId3" imgW="2781000" imgH="1574640" progId="Equation.3">
                   <p:embed/>
                 </p:oleObj>
               </mc:Choice>
@@ -17293,7 +17378,7 @@
           <a:graphicData uri="http://schemas.openxmlformats.org/presentationml/2006/ole">
             <mc:AlternateContent xmlns:mc="http://schemas.openxmlformats.org/markup-compatibility/2006">
               <mc:Choice xmlns:v="urn:schemas-microsoft-com:vml" Requires="v">
-                <p:oleObj spid="_x0000_s406604" name="公式" r:id="rId3" imgW="2692080" imgH="1942920" progId="Equation.3">
+                <p:oleObj spid="_x0000_s406605" name="公式" r:id="rId3" imgW="2692080" imgH="1942920" progId="Equation.3">
                   <p:embed/>
                 </p:oleObj>
               </mc:Choice>
@@ -17424,7 +17509,7 @@
           <a:graphicData uri="http://schemas.openxmlformats.org/presentationml/2006/ole">
             <mc:AlternateContent xmlns:mc="http://schemas.openxmlformats.org/markup-compatibility/2006">
               <mc:Choice xmlns:v="urn:schemas-microsoft-com:vml" Requires="v">
-                <p:oleObj spid="_x0000_s407628" name="公式" r:id="rId4" imgW="3085920" imgH="1739880" progId="Equation.3">
+                <p:oleObj spid="_x0000_s407629" name="公式" r:id="rId4" imgW="3085920" imgH="1739880" progId="Equation.3">
                   <p:embed/>
                 </p:oleObj>
               </mc:Choice>
@@ -20455,7 +20540,7 @@
           <a:graphicData uri="http://schemas.openxmlformats.org/presentationml/2006/ole">
             <mc:AlternateContent xmlns:mc="http://schemas.openxmlformats.org/markup-compatibility/2006">
               <mc:Choice xmlns:v="urn:schemas-microsoft-com:vml" Requires="v">
-                <p:oleObj spid="_x0000_s446536" name="公式" r:id="rId4" imgW="152280" imgH="228600" progId="Equation.3">
+                <p:oleObj spid="_x0000_s446538" name="公式" r:id="rId4" imgW="152280" imgH="228600" progId="Equation.3">
                   <p:embed/>
                 </p:oleObj>
               </mc:Choice>
@@ -20519,7 +20604,7 @@
           <a:graphicData uri="http://schemas.openxmlformats.org/presentationml/2006/ole">
             <mc:AlternateContent xmlns:mc="http://schemas.openxmlformats.org/markup-compatibility/2006">
               <mc:Choice xmlns:v="urn:schemas-microsoft-com:vml" Requires="v">
-                <p:oleObj spid="_x0000_s446537" name="公式" r:id="rId6" imgW="152280" imgH="228600" progId="Equation.3">
+                <p:oleObj spid="_x0000_s446539" name="公式" r:id="rId6" imgW="152280" imgH="228600" progId="Equation.3">
                   <p:embed/>
                 </p:oleObj>
               </mc:Choice>
@@ -20928,7 +21013,7 @@
           <a:graphicData uri="http://schemas.openxmlformats.org/presentationml/2006/ole">
             <mc:AlternateContent xmlns:mc="http://schemas.openxmlformats.org/markup-compatibility/2006">
               <mc:Choice xmlns:v="urn:schemas-microsoft-com:vml" Requires="v">
-                <p:oleObj spid="_x0000_s408806" name="公式" r:id="rId4" imgW="2768400" imgH="660240" progId="Equation.3">
+                <p:oleObj spid="_x0000_s408809" name="公式" r:id="rId4" imgW="2768400" imgH="660240" progId="Equation.3">
                   <p:embed/>
                 </p:oleObj>
               </mc:Choice>
@@ -20992,7 +21077,7 @@
           <a:graphicData uri="http://schemas.openxmlformats.org/presentationml/2006/ole">
             <mc:AlternateContent xmlns:mc="http://schemas.openxmlformats.org/markup-compatibility/2006">
               <mc:Choice xmlns:v="urn:schemas-microsoft-com:vml" Requires="v">
-                <p:oleObj spid="_x0000_s408807" name="公式" r:id="rId6" imgW="152280" imgH="228600" progId="Equation.3">
+                <p:oleObj spid="_x0000_s408810" name="公式" r:id="rId6" imgW="152280" imgH="228600" progId="Equation.3">
                   <p:embed/>
                 </p:oleObj>
               </mc:Choice>
@@ -21062,7 +21147,7 @@
           <a:graphicData uri="http://schemas.openxmlformats.org/presentationml/2006/ole">
             <mc:AlternateContent xmlns:mc="http://schemas.openxmlformats.org/markup-compatibility/2006">
               <mc:Choice xmlns:v="urn:schemas-microsoft-com:vml" Requires="v">
-                <p:oleObj spid="_x0000_s408808" name="公式" r:id="rId8" imgW="2438280" imgH="228600" progId="Equation.3">
+                <p:oleObj spid="_x0000_s408811" name="公式" r:id="rId8" imgW="2438280" imgH="228600" progId="Equation.3">
                   <p:embed/>
                 </p:oleObj>
               </mc:Choice>
@@ -21282,7 +21367,7 @@
           <a:graphicData uri="http://schemas.openxmlformats.org/presentationml/2006/ole">
             <mc:AlternateContent xmlns:mc="http://schemas.openxmlformats.org/markup-compatibility/2006">
               <mc:Choice xmlns:v="urn:schemas-microsoft-com:vml" Requires="v">
-                <p:oleObj spid="_x0000_s409752" name="公式" r:id="rId3" imgW="152280" imgH="228600" progId="Equation.3">
+                <p:oleObj spid="_x0000_s409754" name="公式" r:id="rId3" imgW="152280" imgH="228600" progId="Equation.3">
                   <p:embed/>
                 </p:oleObj>
               </mc:Choice>
@@ -21358,7 +21443,7 @@
           <a:graphicData uri="http://schemas.openxmlformats.org/presentationml/2006/ole">
             <mc:AlternateContent xmlns:mc="http://schemas.openxmlformats.org/markup-compatibility/2006">
               <mc:Choice xmlns:v="urn:schemas-microsoft-com:vml" Requires="v">
-                <p:oleObj spid="_x0000_s409753" name="公式" r:id="rId5" imgW="1434960" imgH="482400" progId="Equation.3">
+                <p:oleObj spid="_x0000_s409755" name="公式" r:id="rId5" imgW="1434960" imgH="482400" progId="Equation.3">
                   <p:embed/>
                 </p:oleObj>
               </mc:Choice>
@@ -21563,7 +21648,7 @@
           <a:graphicData uri="http://schemas.openxmlformats.org/presentationml/2006/ole">
             <mc:AlternateContent xmlns:mc="http://schemas.openxmlformats.org/markup-compatibility/2006">
               <mc:Choice xmlns:v="urn:schemas-microsoft-com:vml" Requires="v">
-                <p:oleObj spid="_x0000_s410701" name="公式" r:id="rId3" imgW="3111480" imgH="965160" progId="Equation.3">
+                <p:oleObj spid="_x0000_s410702" name="公式" r:id="rId3" imgW="3111480" imgH="965160" progId="Equation.3">
                   <p:embed/>
                 </p:oleObj>
               </mc:Choice>
@@ -21717,7 +21802,7 @@
           <a:graphicData uri="http://schemas.openxmlformats.org/presentationml/2006/ole">
             <mc:AlternateContent xmlns:mc="http://schemas.openxmlformats.org/markup-compatibility/2006">
               <mc:Choice xmlns:v="urn:schemas-microsoft-com:vml" Requires="v">
-                <p:oleObj spid="_x0000_s411725" name="公式" r:id="rId4" imgW="2247840" imgH="1371600" progId="Equation.3">
+                <p:oleObj spid="_x0000_s411726" name="公式" r:id="rId4" imgW="2247840" imgH="1371600" progId="Equation.3">
                   <p:embed/>
                 </p:oleObj>
               </mc:Choice>
@@ -21890,7 +21975,7 @@
           <a:graphicData uri="http://schemas.openxmlformats.org/presentationml/2006/ole">
             <mc:AlternateContent xmlns:mc="http://schemas.openxmlformats.org/markup-compatibility/2006">
               <mc:Choice xmlns:v="urn:schemas-microsoft-com:vml" Requires="v">
-                <p:oleObj spid="_x0000_s412749" name="公式" r:id="rId4" imgW="2082600" imgH="1422360" progId="Equation.3">
+                <p:oleObj spid="_x0000_s412750" name="公式" r:id="rId4" imgW="2082600" imgH="1422360" progId="Equation.3">
                   <p:embed/>
                 </p:oleObj>
               </mc:Choice>
@@ -22517,7 +22602,7 @@
           <a:graphicData uri="http://schemas.openxmlformats.org/presentationml/2006/ole">
             <mc:AlternateContent xmlns:mc="http://schemas.openxmlformats.org/markup-compatibility/2006">
               <mc:Choice xmlns:v="urn:schemas-microsoft-com:vml" Requires="v">
-                <p:oleObj spid="_x0000_s413846" name="公式" r:id="rId3" imgW="1460160" imgH="228600" progId="Equation.3">
+                <p:oleObj spid="_x0000_s413848" name="公式" r:id="rId3" imgW="1460160" imgH="228600" progId="Equation.3">
                   <p:embed/>
                 </p:oleObj>
               </mc:Choice>
@@ -22587,7 +22672,7 @@
           <a:graphicData uri="http://schemas.openxmlformats.org/presentationml/2006/ole">
             <mc:AlternateContent xmlns:mc="http://schemas.openxmlformats.org/markup-compatibility/2006">
               <mc:Choice xmlns:v="urn:schemas-microsoft-com:vml" Requires="v">
-                <p:oleObj spid="_x0000_s413847" name="公式" r:id="rId5" imgW="863280" imgH="203040" progId="Equation.3">
+                <p:oleObj spid="_x0000_s413849" name="公式" r:id="rId5" imgW="863280" imgH="203040" progId="Equation.3">
                   <p:embed/>
                 </p:oleObj>
               </mc:Choice>
@@ -22718,7 +22803,7 @@
           <a:graphicData uri="http://schemas.openxmlformats.org/presentationml/2006/ole">
             <mc:AlternateContent xmlns:mc="http://schemas.openxmlformats.org/markup-compatibility/2006">
               <mc:Choice xmlns:v="urn:schemas-microsoft-com:vml" Requires="v">
-                <p:oleObj spid="_x0000_s414798" name="公式" r:id="rId4" imgW="2311200" imgH="1714320" progId="Equation.3">
+                <p:oleObj spid="_x0000_s414799" name="公式" r:id="rId4" imgW="2311200" imgH="1714320" progId="Equation.3">
                   <p:embed/>
                 </p:oleObj>
               </mc:Choice>
@@ -23024,7 +23109,7 @@
           <a:graphicData uri="http://schemas.openxmlformats.org/presentationml/2006/ole">
             <mc:AlternateContent xmlns:mc="http://schemas.openxmlformats.org/markup-compatibility/2006">
               <mc:Choice xmlns:v="urn:schemas-microsoft-com:vml" Requires="v">
-                <p:oleObj spid="_x0000_s415896" name="公式" r:id="rId4" imgW="1600200" imgH="406080" progId="Equation.3">
+                <p:oleObj spid="_x0000_s415898" name="公式" r:id="rId4" imgW="1600200" imgH="406080" progId="Equation.3">
                   <p:embed/>
                 </p:oleObj>
               </mc:Choice>
@@ -23945,7 +24030,7 @@
           <a:graphicData uri="http://schemas.openxmlformats.org/presentationml/2006/ole">
             <mc:AlternateContent xmlns:mc="http://schemas.openxmlformats.org/markup-compatibility/2006">
               <mc:Choice xmlns:v="urn:schemas-microsoft-com:vml" Requires="v">
-                <p:oleObj spid="_x0000_s415897" name="公式" r:id="rId6" imgW="253800" imgH="444240" progId="Equation.3">
+                <p:oleObj spid="_x0000_s415899" name="公式" r:id="rId6" imgW="253800" imgH="444240" progId="Equation.3">
                   <p:embed/>
                 </p:oleObj>
               </mc:Choice>
@@ -25627,7 +25712,7 @@
           <a:graphicData uri="http://schemas.openxmlformats.org/presentationml/2006/ole">
             <mc:AlternateContent xmlns:mc="http://schemas.openxmlformats.org/markup-compatibility/2006">
               <mc:Choice xmlns:v="urn:schemas-microsoft-com:vml" Requires="v">
-                <p:oleObj spid="_x0000_s416844" name="公式" r:id="rId3" imgW="2019240" imgH="1904760" progId="Equation.3">
+                <p:oleObj spid="_x0000_s416845" name="公式" r:id="rId3" imgW="2019240" imgH="1904760" progId="Equation.3">
                   <p:embed/>
                 </p:oleObj>
               </mc:Choice>
@@ -27347,7 +27432,7 @@
           <a:graphicData uri="http://schemas.openxmlformats.org/presentationml/2006/ole">
             <mc:AlternateContent xmlns:mc="http://schemas.openxmlformats.org/markup-compatibility/2006">
               <mc:Choice xmlns:v="urn:schemas-microsoft-com:vml" Requires="v">
-                <p:oleObj spid="_x0000_s417869" name="公式" r:id="rId3" imgW="3022560" imgH="2997000" progId="Equation.3">
+                <p:oleObj spid="_x0000_s417870" name="公式" r:id="rId3" imgW="3022560" imgH="2997000" progId="Equation.3">
                   <p:embed/>
                 </p:oleObj>
               </mc:Choice>
@@ -27510,7 +27595,7 @@
           <a:graphicData uri="http://schemas.openxmlformats.org/presentationml/2006/ole">
             <mc:AlternateContent xmlns:mc="http://schemas.openxmlformats.org/markup-compatibility/2006">
               <mc:Choice xmlns:v="urn:schemas-microsoft-com:vml" Requires="v">
-                <p:oleObj spid="_x0000_s418892" name="公式" r:id="rId3" imgW="2857320" imgH="1155600" progId="Equation.3">
+                <p:oleObj spid="_x0000_s418893" name="公式" r:id="rId3" imgW="2857320" imgH="1155600" progId="Equation.3">
                   <p:embed/>
                 </p:oleObj>
               </mc:Choice>
@@ -27795,7 +27880,7 @@
           <a:graphicData uri="http://schemas.openxmlformats.org/presentationml/2006/ole">
             <mc:AlternateContent xmlns:mc="http://schemas.openxmlformats.org/markup-compatibility/2006">
               <mc:Choice xmlns:v="urn:schemas-microsoft-com:vml" Requires="v">
-                <p:oleObj spid="_x0000_s419916" name="公式" r:id="rId3" imgW="3454200" imgH="2197080" progId="Equation.3">
+                <p:oleObj spid="_x0000_s419917" name="公式" r:id="rId3" imgW="3454200" imgH="2197080" progId="Equation.3">
                   <p:embed/>
                 </p:oleObj>
               </mc:Choice>
@@ -27939,7 +28024,7 @@
           <a:graphicData uri="http://schemas.openxmlformats.org/presentationml/2006/ole">
             <mc:AlternateContent xmlns:mc="http://schemas.openxmlformats.org/markup-compatibility/2006">
               <mc:Choice xmlns:v="urn:schemas-microsoft-com:vml" Requires="v">
-                <p:oleObj spid="_x0000_s420941" name="公式" r:id="rId3" imgW="3187440" imgH="2844720" progId="Equation.3">
+                <p:oleObj spid="_x0000_s420942" name="公式" r:id="rId3" imgW="3187440" imgH="2844720" progId="Equation.3">
                   <p:embed/>
                 </p:oleObj>
               </mc:Choice>
@@ -28085,7 +28170,7 @@
           <a:graphicData uri="http://schemas.openxmlformats.org/presentationml/2006/ole">
             <mc:AlternateContent xmlns:mc="http://schemas.openxmlformats.org/markup-compatibility/2006">
               <mc:Choice xmlns:v="urn:schemas-microsoft-com:vml" Requires="v">
-                <p:oleObj spid="_x0000_s421964" name="公式" r:id="rId4" imgW="3238200" imgH="2133360" progId="Equation.3">
+                <p:oleObj spid="_x0000_s421965" name="公式" r:id="rId4" imgW="3238200" imgH="2133360" progId="Equation.3">
                   <p:embed/>
                 </p:oleObj>
               </mc:Choice>
@@ -28232,7 +28317,7 @@
           <a:graphicData uri="http://schemas.openxmlformats.org/presentationml/2006/ole">
             <mc:AlternateContent xmlns:mc="http://schemas.openxmlformats.org/markup-compatibility/2006">
               <mc:Choice xmlns:v="urn:schemas-microsoft-com:vml" Requires="v">
-                <p:oleObj spid="_x0000_s422988" name="公式" r:id="rId3" imgW="1866600" imgH="1511280" progId="Equation.3">
+                <p:oleObj spid="_x0000_s422989" name="公式" r:id="rId3" imgW="1866600" imgH="1511280" progId="Equation.3">
                   <p:embed/>
                 </p:oleObj>
               </mc:Choice>
@@ -32027,7 +32112,7 @@
           <a:graphicData uri="http://schemas.openxmlformats.org/presentationml/2006/ole">
             <mc:AlternateContent xmlns:mc="http://schemas.openxmlformats.org/markup-compatibility/2006">
               <mc:Choice xmlns:v="urn:schemas-microsoft-com:vml" Requires="v">
-                <p:oleObj spid="_x0000_s437324" name="公式" r:id="rId4" imgW="3136680" imgH="965160" progId="Equation.3">
+                <p:oleObj spid="_x0000_s437325" name="公式" r:id="rId4" imgW="3136680" imgH="965160" progId="Equation.3">
                   <p:embed/>
                 </p:oleObj>
               </mc:Choice>
@@ -32581,7 +32666,7 @@
           <a:graphicData uri="http://schemas.openxmlformats.org/presentationml/2006/ole">
             <mc:AlternateContent xmlns:mc="http://schemas.openxmlformats.org/markup-compatibility/2006">
               <mc:Choice xmlns:v="urn:schemas-microsoft-com:vml" Requires="v">
-                <p:oleObj spid="_x0000_s438349" name="公式" r:id="rId3" imgW="3733560" imgH="1803240" progId="Equation.3">
+                <p:oleObj spid="_x0000_s438350" name="公式" r:id="rId3" imgW="3733560" imgH="1803240" progId="Equation.3">
                   <p:embed/>
                 </p:oleObj>
               </mc:Choice>
@@ -32960,12 +33045,12 @@
           <a:graphicData uri="http://schemas.openxmlformats.org/presentationml/2006/ole">
             <mc:AlternateContent xmlns:mc="http://schemas.openxmlformats.org/markup-compatibility/2006">
               <mc:Choice xmlns:v="urn:schemas-microsoft-com:vml" Requires="v">
-                <p:oleObj spid="_x0000_s439372" name="公式" r:id="rId3" imgW="1726920" imgH="203040" progId="Equation.3">
+                <p:oleObj spid="_x0000_s439373" name="公式" r:id="rId4" imgW="1726920" imgH="203040" progId="Equation.3">
                   <p:embed/>
                 </p:oleObj>
               </mc:Choice>
               <mc:Fallback>
-                <p:oleObj name="公式" r:id="rId3" imgW="1726920" imgH="203040" progId="Equation.3">
+                <p:oleObj name="公式" r:id="rId4" imgW="1726920" imgH="203040" progId="Equation.3">
                   <p:embed/>
                   <p:pic>
                     <p:nvPicPr>
@@ -32976,7 +33061,7 @@
                       <p:nvPr/>
                     </p:nvPicPr>
                     <p:blipFill>
-                      <a:blip r:embed="rId4">
+                      <a:blip r:embed="rId5">
                         <a:extLst>
                           <a:ext uri="{28A0092B-C50C-407E-A947-70E740481C1C}">
                             <a14:useLocalDpi xmlns:a14="http://schemas.microsoft.com/office/drawing/2010/main" val="0"/>
@@ -33287,7 +33372,7 @@
           <a:graphicData uri="http://schemas.openxmlformats.org/presentationml/2006/ole">
             <mc:AlternateContent xmlns:mc="http://schemas.openxmlformats.org/markup-compatibility/2006">
               <mc:Choice xmlns:v="urn:schemas-microsoft-com:vml" Requires="v">
-                <p:oleObj spid="_x0000_s440396" name="公式" r:id="rId3" imgW="3263760" imgH="1193760" progId="Equation.3">
+                <p:oleObj spid="_x0000_s440397" name="公式" r:id="rId3" imgW="3263760" imgH="1193760" progId="Equation.3">
                   <p:embed/>
                 </p:oleObj>
               </mc:Choice>
@@ -34381,7 +34466,13 @@
           <p:cNvGraphicFramePr>
             <a:graphicFrameLocks noGrp="1"/>
           </p:cNvGraphicFramePr>
-          <p:nvPr/>
+          <p:nvPr>
+            <p:extLst>
+              <p:ext uri="{D42A27DB-BD31-4B8C-83A1-F6EECF244321}">
+                <p14:modId xmlns:p14="http://schemas.microsoft.com/office/powerpoint/2010/main" val="766945889"/>
+              </p:ext>
+            </p:extLst>
+          </p:nvPr>
         </p:nvGraphicFramePr>
         <p:xfrm>
           <a:off x="347663" y="373063"/>
@@ -34875,7 +34966,7 @@
                     <a:p>
                       <a:r>
                         <a:rPr lang="zh-CN" altLang="en-US" dirty="0"/>
-                        <a:t>是</a:t>
+                        <a:t>是（）</a:t>
                       </a:r>
                     </a:p>
                   </a:txBody>
@@ -35219,7 +35310,7 @@
                     <a:p>
                       <a:r>
                         <a:rPr lang="zh-CN" altLang="en-US" dirty="0"/>
-                        <a:t>是</a:t>
+                        <a:t>是（）</a:t>
                       </a:r>
                     </a:p>
                   </a:txBody>
@@ -35305,7 +35396,7 @@
                     <a:p>
                       <a:r>
                         <a:rPr lang="zh-CN" altLang="en-US" dirty="0"/>
-                        <a:t>是</a:t>
+                        <a:t>是（）</a:t>
                       </a:r>
                     </a:p>
                   </a:txBody>
@@ -35391,7 +35482,7 @@
                     <a:p>
                       <a:r>
                         <a:rPr lang="zh-CN" altLang="en-US" dirty="0"/>
-                        <a:t>是</a:t>
+                        <a:t>是（）</a:t>
                       </a:r>
                     </a:p>
                   </a:txBody>
@@ -35477,7 +35568,7 @@
                     <a:p>
                       <a:r>
                         <a:rPr lang="zh-CN" altLang="en-US" dirty="0"/>
-                        <a:t>是</a:t>
+                        <a:t>是（）</a:t>
                       </a:r>
                     </a:p>
                   </a:txBody>
@@ -35563,7 +35654,7 @@
                     <a:p>
                       <a:r>
                         <a:rPr lang="zh-CN" altLang="en-US" dirty="0"/>
-                        <a:t>是</a:t>
+                        <a:t>是（）</a:t>
                       </a:r>
                     </a:p>
                   </a:txBody>
@@ -35820,10 +35911,9 @@
                     <a:lstStyle/>
                     <a:p>
                       <a:r>
-                        <a:rPr lang="zh-CN" altLang="en-US"/>
+                        <a:rPr lang="zh-CN" altLang="en-US" dirty="0"/>
                         <a:t>否</a:t>
                       </a:r>
-                      <a:endParaRPr lang="zh-CN" altLang="en-US" dirty="0"/>
                     </a:p>
                   </a:txBody>
                   <a:tcPr/>
@@ -35915,7 +36005,7 @@
           <a:graphicData uri="http://schemas.openxmlformats.org/presentationml/2006/ole">
             <mc:AlternateContent xmlns:mc="http://schemas.openxmlformats.org/markup-compatibility/2006">
               <mc:Choice xmlns:v="urn:schemas-microsoft-com:vml" Requires="v">
-                <p:oleObj spid="_x0000_s441420" name="公式" r:id="rId3" imgW="3873240" imgH="2514600" progId="Equation.3">
+                <p:oleObj spid="_x0000_s441421" name="公式" r:id="rId3" imgW="3873240" imgH="2514600" progId="Equation.3">
                   <p:embed/>
                 </p:oleObj>
               </mc:Choice>
@@ -36046,7 +36136,7 @@
           <a:graphicData uri="http://schemas.openxmlformats.org/presentationml/2006/ole">
             <mc:AlternateContent xmlns:mc="http://schemas.openxmlformats.org/markup-compatibility/2006">
               <mc:Choice xmlns:v="urn:schemas-microsoft-com:vml" Requires="v">
-                <p:oleObj spid="_x0000_s442444" name="公式" r:id="rId3" imgW="3746160" imgH="2336760" progId="Equation.3">
+                <p:oleObj spid="_x0000_s442445" name="公式" r:id="rId3" imgW="3746160" imgH="2336760" progId="Equation.3">
                   <p:embed/>
                 </p:oleObj>
               </mc:Choice>
@@ -37347,7 +37437,7 @@
           <a:graphicData uri="http://schemas.openxmlformats.org/presentationml/2006/ole">
             <mc:AlternateContent xmlns:mc="http://schemas.openxmlformats.org/markup-compatibility/2006">
               <mc:Choice xmlns:v="urn:schemas-microsoft-com:vml" Requires="v">
-                <p:oleObj spid="_x0000_s443468" name="公式" r:id="rId4" imgW="1688760" imgH="914400" progId="Equation.3">
+                <p:oleObj spid="_x0000_s443469" name="公式" r:id="rId4" imgW="1688760" imgH="914400" progId="Equation.3">
                   <p:embed/>
                 </p:oleObj>
               </mc:Choice>
@@ -42398,7 +42488,7 @@
           <a:graphicData uri="http://schemas.openxmlformats.org/presentationml/2006/ole">
             <mc:AlternateContent xmlns:mc="http://schemas.openxmlformats.org/markup-compatibility/2006">
               <mc:Choice xmlns:v="urn:schemas-microsoft-com:vml" Requires="v">
-                <p:oleObj spid="_x0000_s444492" name="公式" r:id="rId3" imgW="3441600" imgH="2133360" progId="Equation.3">
+                <p:oleObj spid="_x0000_s444493" name="公式" r:id="rId3" imgW="3441600" imgH="2133360" progId="Equation.3">
                   <p:embed/>
                 </p:oleObj>
               </mc:Choice>

</xml_diff>